<commit_message>
Updating ML model file
</commit_message>
<xml_diff>
--- a/Capstone1_SDGE_milestone_ppt.pptx
+++ b/Capstone1_SDGE_milestone_ppt.pptx
@@ -146,6 +146,11 @@
       </a:defRPr>
     </a:lvl9pPr>
   </p:defaultTextStyle>
+  <p:extLst>
+    <p:ext uri="{EFAFB233-063F-42B5-8137-9DF3F51BA10A}">
+      <p15:sldGuideLst xmlns:p15="http://schemas.microsoft.com/office/powerpoint/2012/main"/>
+    </p:ext>
+  </p:extLst>
 </p:presentation>
 </file>
 
@@ -231,7 +236,7 @@
           <a:p>
             <a:fld id="{21E79F9E-26E4-4B6D-82DF-6D41BDC836CE}" type="datetimeFigureOut">
               <a:rPr lang="en-US" smtClean="0"/>
-              <a:t>7/24/2019</a:t>
+              <a:t>7/26/2019</a:t>
             </a:fld>
             <a:endParaRPr lang="en-US"/>
           </a:p>
@@ -1319,7 +1324,7 @@
           <a:p>
             <a:fld id="{8588A4BC-561D-4725-8C08-4C9721C138EF}" type="datetimeFigureOut">
               <a:rPr lang="en-US" smtClean="0"/>
-              <a:t>7/24/2019</a:t>
+              <a:t>7/26/2019</a:t>
             </a:fld>
             <a:endParaRPr lang="en-US"/>
           </a:p>
@@ -1517,7 +1522,7 @@
           <a:p>
             <a:fld id="{8588A4BC-561D-4725-8C08-4C9721C138EF}" type="datetimeFigureOut">
               <a:rPr lang="en-US" smtClean="0"/>
-              <a:t>7/24/2019</a:t>
+              <a:t>7/26/2019</a:t>
             </a:fld>
             <a:endParaRPr lang="en-US"/>
           </a:p>
@@ -1725,7 +1730,7 @@
           <a:p>
             <a:fld id="{8588A4BC-561D-4725-8C08-4C9721C138EF}" type="datetimeFigureOut">
               <a:rPr lang="en-US" smtClean="0"/>
-              <a:t>7/24/2019</a:t>
+              <a:t>7/26/2019</a:t>
             </a:fld>
             <a:endParaRPr lang="en-US"/>
           </a:p>
@@ -1923,7 +1928,7 @@
           <a:p>
             <a:fld id="{8588A4BC-561D-4725-8C08-4C9721C138EF}" type="datetimeFigureOut">
               <a:rPr lang="en-US" smtClean="0"/>
-              <a:t>7/24/2019</a:t>
+              <a:t>7/26/2019</a:t>
             </a:fld>
             <a:endParaRPr lang="en-US"/>
           </a:p>
@@ -2198,7 +2203,7 @@
           <a:p>
             <a:fld id="{8588A4BC-561D-4725-8C08-4C9721C138EF}" type="datetimeFigureOut">
               <a:rPr lang="en-US" smtClean="0"/>
-              <a:t>7/24/2019</a:t>
+              <a:t>7/26/2019</a:t>
             </a:fld>
             <a:endParaRPr lang="en-US"/>
           </a:p>
@@ -2463,7 +2468,7 @@
           <a:p>
             <a:fld id="{8588A4BC-561D-4725-8C08-4C9721C138EF}" type="datetimeFigureOut">
               <a:rPr lang="en-US" smtClean="0"/>
-              <a:t>7/24/2019</a:t>
+              <a:t>7/26/2019</a:t>
             </a:fld>
             <a:endParaRPr lang="en-US"/>
           </a:p>
@@ -2875,7 +2880,7 @@
           <a:p>
             <a:fld id="{8588A4BC-561D-4725-8C08-4C9721C138EF}" type="datetimeFigureOut">
               <a:rPr lang="en-US" smtClean="0"/>
-              <a:t>7/24/2019</a:t>
+              <a:t>7/26/2019</a:t>
             </a:fld>
             <a:endParaRPr lang="en-US"/>
           </a:p>
@@ -3016,7 +3021,7 @@
           <a:p>
             <a:fld id="{8588A4BC-561D-4725-8C08-4C9721C138EF}" type="datetimeFigureOut">
               <a:rPr lang="en-US" smtClean="0"/>
-              <a:t>7/24/2019</a:t>
+              <a:t>7/26/2019</a:t>
             </a:fld>
             <a:endParaRPr lang="en-US"/>
           </a:p>
@@ -3129,7 +3134,7 @@
           <a:p>
             <a:fld id="{8588A4BC-561D-4725-8C08-4C9721C138EF}" type="datetimeFigureOut">
               <a:rPr lang="en-US" smtClean="0"/>
-              <a:t>7/24/2019</a:t>
+              <a:t>7/26/2019</a:t>
             </a:fld>
             <a:endParaRPr lang="en-US"/>
           </a:p>
@@ -3440,7 +3445,7 @@
           <a:p>
             <a:fld id="{8588A4BC-561D-4725-8C08-4C9721C138EF}" type="datetimeFigureOut">
               <a:rPr lang="en-US" smtClean="0"/>
-              <a:t>7/24/2019</a:t>
+              <a:t>7/26/2019</a:t>
             </a:fld>
             <a:endParaRPr lang="en-US"/>
           </a:p>
@@ -3728,7 +3733,7 @@
           <a:p>
             <a:fld id="{8588A4BC-561D-4725-8C08-4C9721C138EF}" type="datetimeFigureOut">
               <a:rPr lang="en-US" smtClean="0"/>
-              <a:t>7/24/2019</a:t>
+              <a:t>7/26/2019</a:t>
             </a:fld>
             <a:endParaRPr lang="en-US"/>
           </a:p>
@@ -3969,7 +3974,7 @@
           <a:p>
             <a:fld id="{8588A4BC-561D-4725-8C08-4C9721C138EF}" type="datetimeFigureOut">
               <a:rPr lang="en-US" smtClean="0"/>
-              <a:t>7/24/2019</a:t>
+              <a:t>7/26/2019</a:t>
             </a:fld>
             <a:endParaRPr lang="en-US"/>
           </a:p>

</xml_diff>